<commit_message>
presentation finalised, report started
</commit_message>
<xml_diff>
--- a/presentation/satvikkishoew_finalproj.pptx
+++ b/presentation/satvikkishoew_finalproj.pptx
@@ -6,8 +6,8 @@
   </p:sldMasterIdLst>
   <p:sldIdLst>
     <p:sldId id="256" r:id="rId2"/>
-    <p:sldId id="257" r:id="rId3"/>
-    <p:sldId id="258" r:id="rId4"/>
+    <p:sldId id="258" r:id="rId3"/>
+    <p:sldId id="257" r:id="rId4"/>
     <p:sldId id="259" r:id="rId5"/>
     <p:sldId id="260" r:id="rId6"/>
     <p:sldId id="261" r:id="rId7"/>
@@ -3316,6 +3316,13 @@
   <p:clrMapOvr>
     <a:masterClrMapping/>
   </p:clrMapOvr>
+  <p:timing>
+    <p:tnLst>
+      <p:par>
+        <p:cTn id="1" dur="indefinite" restart="never" nodeType="tmRoot"/>
+      </p:par>
+    </p:tnLst>
+  </p:timing>
 </p:sld>
 </file>
 
@@ -3736,6 +3743,149 @@
       </p:grpSpPr>
       <p:sp>
         <p:nvSpPr>
+          <p:cNvPr id="3" name="Content Placeholder 2"/>
+          <p:cNvSpPr>
+            <a:spLocks noGrp="1"/>
+          </p:cNvSpPr>
+          <p:nvPr>
+            <p:ph idx="1"/>
+          </p:nvPr>
+        </p:nvSpPr>
+        <p:spPr>
+          <a:xfrm>
+            <a:off x="790433" y="1907512"/>
+            <a:ext cx="10515600" cy="3858668"/>
+          </a:xfrm>
+        </p:spPr>
+        <p:txBody>
+          <a:bodyPr>
+            <a:normAutofit/>
+          </a:bodyPr>
+          <a:lstStyle/>
+          <a:p>
+            <a:pPr>
+              <a:lnSpc>
+                <a:spcPct val="100000"/>
+              </a:lnSpc>
+              <a:spcAft>
+                <a:spcPts val="1200"/>
+              </a:spcAft>
+            </a:pPr>
+            <a:r>
+              <a:rPr lang="en-US" dirty="0" smtClean="0"/>
+              <a:t>Are there differences in quality across directors?</a:t>
+            </a:r>
+          </a:p>
+          <a:p>
+            <a:pPr>
+              <a:lnSpc>
+                <a:spcPct val="100000"/>
+              </a:lnSpc>
+              <a:spcAft>
+                <a:spcPts val="1200"/>
+              </a:spcAft>
+            </a:pPr>
+            <a:r>
+              <a:rPr lang="en-US" dirty="0" smtClean="0"/>
+              <a:t>What are the differences in quality across four shows and their constituent seasons?</a:t>
+            </a:r>
+          </a:p>
+          <a:p>
+            <a:pPr>
+              <a:lnSpc>
+                <a:spcPct val="100000"/>
+              </a:lnSpc>
+              <a:spcAft>
+                <a:spcPts val="1200"/>
+              </a:spcAft>
+            </a:pPr>
+            <a:r>
+              <a:rPr lang="en-US" dirty="0" smtClean="0"/>
+              <a:t>Which characters were the most liked/disliked?</a:t>
+            </a:r>
+            <a:endParaRPr lang="en-US" dirty="0"/>
+          </a:p>
+        </p:txBody>
+      </p:sp>
+      <p:sp>
+        <p:nvSpPr>
+          <p:cNvPr id="4" name="Title 1"/>
+          <p:cNvSpPr>
+            <a:spLocks noGrp="1"/>
+          </p:cNvSpPr>
+          <p:nvPr>
+            <p:ph type="title"/>
+          </p:nvPr>
+        </p:nvSpPr>
+        <p:spPr>
+          <a:xfrm>
+            <a:off x="790433" y="249031"/>
+            <a:ext cx="10257430" cy="1325563"/>
+          </a:xfrm>
+        </p:spPr>
+        <p:txBody>
+          <a:bodyPr>
+            <a:normAutofit/>
+          </a:bodyPr>
+          <a:lstStyle/>
+          <a:p>
+            <a:r>
+              <a:rPr lang="en-US" sz="4800" dirty="0" smtClean="0">
+                <a:solidFill>
+                  <a:srgbClr val="F8CE21"/>
+                </a:solidFill>
+                <a:latin typeface="Franklin Gothic Demi" panose="020B0703020102020204" pitchFamily="34" charset="0"/>
+              </a:rPr>
+              <a:t>RESEARCH QUESTIONS</a:t>
+            </a:r>
+            <a:endParaRPr lang="en-US" sz="4800" dirty="0">
+              <a:solidFill>
+                <a:srgbClr val="F8CE21"/>
+              </a:solidFill>
+              <a:latin typeface="Franklin Gothic Demi" panose="020B0703020102020204" pitchFamily="34" charset="0"/>
+            </a:endParaRPr>
+          </a:p>
+        </p:txBody>
+      </p:sp>
+    </p:spTree>
+    <p:extLst>
+      <p:ext uri="{BB962C8B-B14F-4D97-AF65-F5344CB8AC3E}">
+        <p14:creationId xmlns:p14="http://schemas.microsoft.com/office/powerpoint/2010/main" val="2848367724"/>
+      </p:ext>
+    </p:extLst>
+  </p:cSld>
+  <p:clrMapOvr>
+    <a:masterClrMapping/>
+  </p:clrMapOvr>
+  <p:timing>
+    <p:tnLst>
+      <p:par>
+        <p:cTn id="1" dur="indefinite" restart="never" nodeType="tmRoot"/>
+      </p:par>
+    </p:tnLst>
+  </p:timing>
+</p:sld>
+</file>
+
+<file path=ppt/slides/slide3.xml><?xml version="1.0" encoding="utf-8"?>
+<p:sld xmlns:a="http://schemas.openxmlformats.org/drawingml/2006/main" xmlns:r="http://schemas.openxmlformats.org/officeDocument/2006/relationships" xmlns:p="http://schemas.openxmlformats.org/presentationml/2006/main">
+  <p:cSld>
+    <p:spTree>
+      <p:nvGrpSpPr>
+        <p:cNvPr id="1" name=""/>
+        <p:cNvGrpSpPr/>
+        <p:nvPr/>
+      </p:nvGrpSpPr>
+      <p:grpSpPr>
+        <a:xfrm>
+          <a:off x="0" y="0"/>
+          <a:ext cx="0" cy="0"/>
+          <a:chOff x="0" y="0"/>
+          <a:chExt cx="0" cy="0"/>
+        </a:xfrm>
+      </p:grpSpPr>
+      <p:sp>
+        <p:nvSpPr>
           <p:cNvPr id="2" name="Title 1"/>
           <p:cNvSpPr>
             <a:spLocks noGrp="1"/>
@@ -3796,7 +3946,7 @@
         </p:blipFill>
         <p:spPr>
           <a:xfrm>
-            <a:off x="2283258" y="1546713"/>
+            <a:off x="2283258" y="1147465"/>
             <a:ext cx="2381250" cy="1162050"/>
           </a:xfrm>
           <a:prstGeom prst="rect">
@@ -3826,7 +3976,7 @@
         </p:blipFill>
         <p:spPr>
           <a:xfrm>
-            <a:off x="2195663" y="2708763"/>
+            <a:off x="2195663" y="2309515"/>
             <a:ext cx="2707327" cy="1013314"/>
           </a:xfrm>
           <a:prstGeom prst="rect">
@@ -3856,7 +4006,7 @@
         </p:blipFill>
         <p:spPr>
           <a:xfrm>
-            <a:off x="2154280" y="4735391"/>
+            <a:off x="2154280" y="4336143"/>
             <a:ext cx="2790092" cy="708422"/>
           </a:xfrm>
           <a:prstGeom prst="rect">
@@ -3886,7 +4036,7 @@
         </p:blipFill>
         <p:spPr>
           <a:xfrm>
-            <a:off x="2239460" y="3722077"/>
+            <a:off x="2239460" y="3322829"/>
             <a:ext cx="2619732" cy="861646"/>
           </a:xfrm>
           <a:prstGeom prst="rect">
@@ -3902,7 +4052,7 @@
         </p:nvCxnSpPr>
         <p:spPr>
           <a:xfrm>
-            <a:off x="2063262" y="2708763"/>
+            <a:off x="2063262" y="2309515"/>
             <a:ext cx="2839728" cy="0"/>
           </a:xfrm>
           <a:prstGeom prst="line">
@@ -3937,7 +4087,7 @@
         </p:nvCxnSpPr>
         <p:spPr>
           <a:xfrm>
-            <a:off x="2063262" y="3652471"/>
+            <a:off x="2063262" y="3253223"/>
             <a:ext cx="2839728" cy="0"/>
           </a:xfrm>
           <a:prstGeom prst="line">
@@ -3972,7 +4122,7 @@
         </p:nvCxnSpPr>
         <p:spPr>
           <a:xfrm>
-            <a:off x="2063262" y="4735391"/>
+            <a:off x="2063262" y="4336143"/>
             <a:ext cx="2839728" cy="0"/>
           </a:xfrm>
           <a:prstGeom prst="line">
@@ -4007,7 +4157,7 @@
         </p:nvSpPr>
         <p:spPr>
           <a:xfrm>
-            <a:off x="225239" y="2093274"/>
+            <a:off x="225239" y="1694026"/>
             <a:ext cx="1792478" cy="369332"/>
           </a:xfrm>
           <a:prstGeom prst="rect">
@@ -4041,7 +4191,7 @@
         </p:nvSpPr>
         <p:spPr>
           <a:xfrm>
-            <a:off x="252298" y="3030754"/>
+            <a:off x="252298" y="2631506"/>
             <a:ext cx="1750800" cy="369332"/>
           </a:xfrm>
           <a:prstGeom prst="rect">
@@ -4071,7 +4221,7 @@
         </p:nvSpPr>
         <p:spPr>
           <a:xfrm>
-            <a:off x="252298" y="3886539"/>
+            <a:off x="252298" y="3487291"/>
             <a:ext cx="1772024" cy="369332"/>
           </a:xfrm>
           <a:prstGeom prst="rect">
@@ -4101,7 +4251,7 @@
         </p:nvSpPr>
         <p:spPr>
           <a:xfrm>
-            <a:off x="258902" y="4824019"/>
+            <a:off x="258902" y="4424771"/>
             <a:ext cx="1758815" cy="369332"/>
           </a:xfrm>
           <a:prstGeom prst="rect">
@@ -4131,7 +4281,7 @@
         </p:nvSpPr>
         <p:spPr>
           <a:xfrm>
-            <a:off x="4944372" y="1835350"/>
+            <a:off x="4944372" y="1436102"/>
             <a:ext cx="1340432" cy="584775"/>
           </a:xfrm>
           <a:prstGeom prst="rect">
@@ -4168,7 +4318,7 @@
         </p:nvSpPr>
         <p:spPr>
           <a:xfrm>
-            <a:off x="4944372" y="2923032"/>
+            <a:off x="4944372" y="2523784"/>
             <a:ext cx="1340432" cy="584775"/>
           </a:xfrm>
           <a:prstGeom prst="rect">
@@ -4205,7 +4355,7 @@
         </p:nvSpPr>
         <p:spPr>
           <a:xfrm>
-            <a:off x="4944372" y="3936347"/>
+            <a:off x="4944372" y="3537099"/>
             <a:ext cx="1340432" cy="584775"/>
           </a:xfrm>
           <a:prstGeom prst="rect">
@@ -4242,7 +4392,7 @@
         </p:nvSpPr>
         <p:spPr>
           <a:xfrm>
-            <a:off x="4944372" y="4716297"/>
+            <a:off x="4944372" y="4317049"/>
             <a:ext cx="1367682" cy="584775"/>
           </a:xfrm>
           <a:prstGeom prst="rect">
@@ -4293,7 +4443,7 @@
         </p:blipFill>
         <p:spPr>
           <a:xfrm>
-            <a:off x="10160965" y="2932068"/>
+            <a:off x="10160965" y="2532820"/>
             <a:ext cx="1813357" cy="954471"/>
           </a:xfrm>
           <a:prstGeom prst="rect">
@@ -4309,7 +4459,7 @@
         </p:nvSpPr>
         <p:spPr>
           <a:xfrm>
-            <a:off x="6691537" y="2350519"/>
+            <a:off x="6691537" y="1951271"/>
             <a:ext cx="1348318" cy="523220"/>
           </a:xfrm>
           <a:prstGeom prst="rect">
@@ -4339,7 +4489,7 @@
         </p:nvCxnSpPr>
         <p:spPr>
           <a:xfrm>
-            <a:off x="6402949" y="1835350"/>
+            <a:off x="6402949" y="1436102"/>
             <a:ext cx="0" cy="3465722"/>
           </a:xfrm>
           <a:prstGeom prst="line">
@@ -4374,7 +4524,7 @@
         </p:nvCxnSpPr>
         <p:spPr>
           <a:xfrm>
-            <a:off x="8322735" y="1835350"/>
+            <a:off x="8322735" y="1436102"/>
             <a:ext cx="0" cy="3465722"/>
           </a:xfrm>
           <a:prstGeom prst="line">
@@ -4411,7 +4561,7 @@
         </p:nvCxnSpPr>
         <p:spPr>
           <a:xfrm>
-            <a:off x="7365696" y="2873739"/>
+            <a:off x="7365696" y="2474491"/>
             <a:ext cx="0" cy="778732"/>
           </a:xfrm>
           <a:prstGeom prst="straightConnector1">
@@ -4447,7 +4597,7 @@
         </p:nvSpPr>
         <p:spPr>
           <a:xfrm>
-            <a:off x="6574859" y="3652471"/>
+            <a:off x="6574859" y="3253223"/>
             <a:ext cx="1648913" cy="1015663"/>
           </a:xfrm>
           <a:prstGeom prst="rect">
@@ -4488,7 +4638,7 @@
         </p:nvCxnSpPr>
         <p:spPr>
           <a:xfrm>
-            <a:off x="10011269" y="1835350"/>
+            <a:off x="10011269" y="1436102"/>
             <a:ext cx="0" cy="3465722"/>
           </a:xfrm>
           <a:prstGeom prst="line">
@@ -4523,7 +4673,7 @@
         </p:nvSpPr>
         <p:spPr>
           <a:xfrm>
-            <a:off x="8492545" y="3048053"/>
+            <a:off x="8492545" y="2648805"/>
             <a:ext cx="1369029" cy="523220"/>
           </a:xfrm>
           <a:prstGeom prst="rect">
@@ -4553,7 +4703,7 @@
         </p:nvSpPr>
         <p:spPr>
           <a:xfrm>
-            <a:off x="3425588" y="5863231"/>
+            <a:off x="4268623" y="5096925"/>
             <a:ext cx="7705699" cy="646331"/>
           </a:xfrm>
           <a:prstGeom prst="rect">
@@ -4590,146 +4740,55 @@
           </a:p>
         </p:txBody>
       </p:sp>
+      <p:sp>
+        <p:nvSpPr>
+          <p:cNvPr id="33" name="TextBox 32"/>
+          <p:cNvSpPr txBox="1"/>
+          <p:nvPr/>
+        </p:nvSpPr>
+        <p:spPr>
+          <a:xfrm>
+            <a:off x="225239" y="5963606"/>
+            <a:ext cx="4832605" cy="646331"/>
+          </a:xfrm>
+          <a:prstGeom prst="rect">
+            <a:avLst/>
+          </a:prstGeom>
+          <a:noFill/>
+        </p:spPr>
+        <p:txBody>
+          <a:bodyPr wrap="none" rtlCol="0">
+            <a:spAutoFit/>
+          </a:bodyPr>
+          <a:lstStyle/>
+          <a:p>
+            <a:r>
+              <a:rPr lang="en-IN" dirty="0" smtClean="0"/>
+              <a:t>Sources</a:t>
+            </a:r>
+            <a:r>
+              <a:rPr lang="en-IN" dirty="0"/>
+              <a:t>: </a:t>
+            </a:r>
+            <a:r>
+              <a:rPr lang="en-IN" dirty="0" smtClean="0"/>
+              <a:t>www.chakoteya.net/StarTrek/index.html</a:t>
+            </a:r>
+            <a:br>
+              <a:rPr lang="en-IN" dirty="0" smtClean="0"/>
+            </a:br>
+            <a:r>
+              <a:rPr lang="en-IN" dirty="0" smtClean="0"/>
+              <a:t>                  datasets.imdbws.com</a:t>
+            </a:r>
+            <a:endParaRPr lang="en-US" dirty="0"/>
+          </a:p>
+        </p:txBody>
+      </p:sp>
     </p:spTree>
     <p:extLst>
       <p:ext uri="{BB962C8B-B14F-4D97-AF65-F5344CB8AC3E}">
         <p14:creationId xmlns:p14="http://schemas.microsoft.com/office/powerpoint/2010/main" val="3279742894"/>
-      </p:ext>
-    </p:extLst>
-  </p:cSld>
-  <p:clrMapOvr>
-    <a:masterClrMapping/>
-  </p:clrMapOvr>
-</p:sld>
-</file>
-
-<file path=ppt/slides/slide3.xml><?xml version="1.0" encoding="utf-8"?>
-<p:sld xmlns:a="http://schemas.openxmlformats.org/drawingml/2006/main" xmlns:r="http://schemas.openxmlformats.org/officeDocument/2006/relationships" xmlns:p="http://schemas.openxmlformats.org/presentationml/2006/main">
-  <p:cSld>
-    <p:spTree>
-      <p:nvGrpSpPr>
-        <p:cNvPr id="1" name=""/>
-        <p:cNvGrpSpPr/>
-        <p:nvPr/>
-      </p:nvGrpSpPr>
-      <p:grpSpPr>
-        <a:xfrm>
-          <a:off x="0" y="0"/>
-          <a:ext cx="0" cy="0"/>
-          <a:chOff x="0" y="0"/>
-          <a:chExt cx="0" cy="0"/>
-        </a:xfrm>
-      </p:grpSpPr>
-      <p:sp>
-        <p:nvSpPr>
-          <p:cNvPr id="3" name="Content Placeholder 2"/>
-          <p:cNvSpPr>
-            <a:spLocks noGrp="1"/>
-          </p:cNvSpPr>
-          <p:nvPr>
-            <p:ph idx="1"/>
-          </p:nvPr>
-        </p:nvSpPr>
-        <p:spPr>
-          <a:xfrm>
-            <a:off x="790433" y="1907512"/>
-            <a:ext cx="10515600" cy="3858668"/>
-          </a:xfrm>
-        </p:spPr>
-        <p:txBody>
-          <a:bodyPr>
-            <a:normAutofit/>
-          </a:bodyPr>
-          <a:lstStyle/>
-          <a:p>
-            <a:pPr>
-              <a:lnSpc>
-                <a:spcPct val="100000"/>
-              </a:lnSpc>
-              <a:spcAft>
-                <a:spcPts val="1200"/>
-              </a:spcAft>
-            </a:pPr>
-            <a:r>
-              <a:rPr lang="en-US" dirty="0" smtClean="0"/>
-              <a:t>Are there differences in quality across directors?</a:t>
-            </a:r>
-          </a:p>
-          <a:p>
-            <a:pPr>
-              <a:lnSpc>
-                <a:spcPct val="100000"/>
-              </a:lnSpc>
-              <a:spcAft>
-                <a:spcPts val="1200"/>
-              </a:spcAft>
-            </a:pPr>
-            <a:r>
-              <a:rPr lang="en-US" dirty="0" smtClean="0"/>
-              <a:t>What are the differences in quality across the four shows and constituent seasons?</a:t>
-            </a:r>
-          </a:p>
-          <a:p>
-            <a:pPr>
-              <a:lnSpc>
-                <a:spcPct val="100000"/>
-              </a:lnSpc>
-              <a:spcAft>
-                <a:spcPts val="1200"/>
-              </a:spcAft>
-            </a:pPr>
-            <a:r>
-              <a:rPr lang="en-US" dirty="0" smtClean="0"/>
-              <a:t>Which characters were the most liked/disliked?</a:t>
-            </a:r>
-            <a:endParaRPr lang="en-US" dirty="0"/>
-          </a:p>
-        </p:txBody>
-      </p:sp>
-      <p:sp>
-        <p:nvSpPr>
-          <p:cNvPr id="4" name="Title 1"/>
-          <p:cNvSpPr>
-            <a:spLocks noGrp="1"/>
-          </p:cNvSpPr>
-          <p:nvPr>
-            <p:ph type="title"/>
-          </p:nvPr>
-        </p:nvSpPr>
-        <p:spPr>
-          <a:xfrm>
-            <a:off x="790433" y="249031"/>
-            <a:ext cx="10257430" cy="1325563"/>
-          </a:xfrm>
-        </p:spPr>
-        <p:txBody>
-          <a:bodyPr>
-            <a:normAutofit/>
-          </a:bodyPr>
-          <a:lstStyle/>
-          <a:p>
-            <a:r>
-              <a:rPr lang="en-US" sz="4800" dirty="0" smtClean="0">
-                <a:solidFill>
-                  <a:srgbClr val="F8CE21"/>
-                </a:solidFill>
-                <a:latin typeface="Franklin Gothic Demi" panose="020B0703020102020204" pitchFamily="34" charset="0"/>
-              </a:rPr>
-              <a:t>RESEARCH QUESTIONS</a:t>
-            </a:r>
-            <a:endParaRPr lang="en-US" sz="4800" dirty="0">
-              <a:solidFill>
-                <a:srgbClr val="F8CE21"/>
-              </a:solidFill>
-              <a:latin typeface="Franklin Gothic Demi" panose="020B0703020102020204" pitchFamily="34" charset="0"/>
-            </a:endParaRPr>
-          </a:p>
-        </p:txBody>
-      </p:sp>
-    </p:spTree>
-    <p:extLst>
-      <p:ext uri="{BB962C8B-B14F-4D97-AF65-F5344CB8AC3E}">
-        <p14:creationId xmlns:p14="http://schemas.microsoft.com/office/powerpoint/2010/main" val="2848367724"/>
       </p:ext>
     </p:extLst>
   </p:cSld>

</xml_diff>